<commit_message>
04. CSS Media Queries & SASS
</commit_message>
<xml_diff>
--- a/04. CSS Media Queries & SASS/04. CSS Media Queries & SASS.pptx
+++ b/04. CSS Media Queries & SASS/04. CSS Media Queries & SASS.pptx
@@ -314,7 +314,7 @@
           <a:p>
             <a:fld id="{44BF7E79-A73C-4B14-A500-2DC639C8360F}" type="datetimeFigureOut">
               <a:rPr lang="bg-BG" smtClean="0"/>
-              <a:t>15.05.2019</a:t>
+              <a:t>22.05.2019</a:t>
             </a:fld>
             <a:endParaRPr lang="bg-BG" dirty="0"/>
           </a:p>
@@ -514,7 +514,7 @@
           <a:p>
             <a:fld id="{44BF7E79-A73C-4B14-A500-2DC639C8360F}" type="datetimeFigureOut">
               <a:rPr lang="bg-BG" smtClean="0"/>
-              <a:t>15.05.2019</a:t>
+              <a:t>22.05.2019</a:t>
             </a:fld>
             <a:endParaRPr lang="bg-BG" dirty="0"/>
           </a:p>
@@ -724,7 +724,7 @@
           <a:p>
             <a:fld id="{44BF7E79-A73C-4B14-A500-2DC639C8360F}" type="datetimeFigureOut">
               <a:rPr lang="bg-BG" smtClean="0"/>
-              <a:t>15.05.2019</a:t>
+              <a:t>22.05.2019</a:t>
             </a:fld>
             <a:endParaRPr lang="bg-BG" dirty="0"/>
           </a:p>
@@ -924,7 +924,7 @@
           <a:p>
             <a:fld id="{44BF7E79-A73C-4B14-A500-2DC639C8360F}" type="datetimeFigureOut">
               <a:rPr lang="bg-BG" smtClean="0"/>
-              <a:t>15.05.2019</a:t>
+              <a:t>22.05.2019</a:t>
             </a:fld>
             <a:endParaRPr lang="bg-BG" dirty="0"/>
           </a:p>
@@ -1200,7 +1200,7 @@
           <a:p>
             <a:fld id="{44BF7E79-A73C-4B14-A500-2DC639C8360F}" type="datetimeFigureOut">
               <a:rPr lang="bg-BG" smtClean="0"/>
-              <a:t>15.05.2019</a:t>
+              <a:t>22.05.2019</a:t>
             </a:fld>
             <a:endParaRPr lang="bg-BG" dirty="0"/>
           </a:p>
@@ -1468,7 +1468,7 @@
           <a:p>
             <a:fld id="{44BF7E79-A73C-4B14-A500-2DC639C8360F}" type="datetimeFigureOut">
               <a:rPr lang="bg-BG" smtClean="0"/>
-              <a:t>15.05.2019</a:t>
+              <a:t>22.05.2019</a:t>
             </a:fld>
             <a:endParaRPr lang="bg-BG" dirty="0"/>
           </a:p>
@@ -1883,7 +1883,7 @@
           <a:p>
             <a:fld id="{44BF7E79-A73C-4B14-A500-2DC639C8360F}" type="datetimeFigureOut">
               <a:rPr lang="bg-BG" smtClean="0"/>
-              <a:t>15.05.2019</a:t>
+              <a:t>22.05.2019</a:t>
             </a:fld>
             <a:endParaRPr lang="bg-BG" dirty="0"/>
           </a:p>
@@ -2025,7 +2025,7 @@
           <a:p>
             <a:fld id="{44BF7E79-A73C-4B14-A500-2DC639C8360F}" type="datetimeFigureOut">
               <a:rPr lang="bg-BG" smtClean="0"/>
-              <a:t>15.05.2019</a:t>
+              <a:t>22.05.2019</a:t>
             </a:fld>
             <a:endParaRPr lang="bg-BG" dirty="0"/>
           </a:p>
@@ -2138,7 +2138,7 @@
           <a:p>
             <a:fld id="{44BF7E79-A73C-4B14-A500-2DC639C8360F}" type="datetimeFigureOut">
               <a:rPr lang="bg-BG" smtClean="0"/>
-              <a:t>15.05.2019</a:t>
+              <a:t>22.05.2019</a:t>
             </a:fld>
             <a:endParaRPr lang="bg-BG" dirty="0"/>
           </a:p>
@@ -2451,7 +2451,7 @@
           <a:p>
             <a:fld id="{44BF7E79-A73C-4B14-A500-2DC639C8360F}" type="datetimeFigureOut">
               <a:rPr lang="bg-BG" smtClean="0"/>
-              <a:t>15.05.2019</a:t>
+              <a:t>22.05.2019</a:t>
             </a:fld>
             <a:endParaRPr lang="bg-BG" dirty="0"/>
           </a:p>
@@ -2740,7 +2740,7 @@
           <a:p>
             <a:fld id="{44BF7E79-A73C-4B14-A500-2DC639C8360F}" type="datetimeFigureOut">
               <a:rPr lang="bg-BG" smtClean="0"/>
-              <a:t>15.05.2019</a:t>
+              <a:t>22.05.2019</a:t>
             </a:fld>
             <a:endParaRPr lang="bg-BG" dirty="0"/>
           </a:p>
@@ -2983,7 +2983,7 @@
           <a:p>
             <a:fld id="{44BF7E79-A73C-4B14-A500-2DC639C8360F}" type="datetimeFigureOut">
               <a:rPr lang="bg-BG" smtClean="0"/>
-              <a:t>15.05.2019</a:t>
+              <a:t>22.05.2019</a:t>
             </a:fld>
             <a:endParaRPr lang="bg-BG" dirty="0"/>
           </a:p>
@@ -5644,7 +5644,7 @@
         <p:spPr>
           <a:xfrm>
             <a:off x="1524000" y="2303161"/>
-            <a:ext cx="10363200" cy="1125839"/>
+            <a:ext cx="10363200" cy="1605899"/>
           </a:xfrm>
           <a:prstGeom prst="rect">
             <a:avLst/>
@@ -5674,7 +5674,11 @@
             </a:lvl1pPr>
           </a:lstStyle>
           <a:p>
-            <a:pPr algn="l"/>
+            <a:pPr algn="l">
+              <a:lnSpc>
+                <a:spcPct val="120000"/>
+              </a:lnSpc>
+            </a:pPr>
             <a:r>
               <a:rPr lang="en-US" sz="2400" dirty="0">
                 <a:solidFill>
@@ -9045,7 +9049,7 @@
         </p:spPr>
         <p:txBody>
           <a:bodyPr vert="horz" lIns="91440" tIns="45720" rIns="91440" bIns="45720" rtlCol="0" anchor="t">
-            <a:normAutofit fontScale="97500"/>
+            <a:normAutofit fontScale="97500" lnSpcReduction="10000"/>
           </a:bodyPr>
           <a:lstStyle>
             <a:lvl1pPr algn="ctr" defTabSz="914400" rtl="0" eaLnBrk="1" latinLnBrk="0" hangingPunct="1">
@@ -9067,7 +9071,11 @@
             </a:lvl1pPr>
           </a:lstStyle>
           <a:p>
-            <a:pPr algn="l"/>
+            <a:pPr algn="l">
+              <a:lnSpc>
+                <a:spcPct val="120000"/>
+              </a:lnSpc>
+            </a:pPr>
             <a:r>
               <a:rPr lang="en-US" sz="2400" dirty="0">
                 <a:solidFill>

</xml_diff>